<commit_message>
updating code and slides
</commit_message>
<xml_diff>
--- a/slides/09_data_cleaning_and_manipulation.pptx
+++ b/slides/09_data_cleaning_and_manipulation.pptx
@@ -257,7 +257,7 @@
           <a:p>
             <a:fld id="{DB92F479-4B50-F243-9713-1B12EC2B4BDB}" type="datetimeFigureOut">
               <a:rPr lang="en-US" smtClean="0"/>
-              <a:t>2/12/15</a:t>
+              <a:t>2/17/15</a:t>
             </a:fld>
             <a:endParaRPr lang="en-US"/>
           </a:p>
@@ -1940,13 +1940,6 @@
               </a:rPr>
               <a:t>If every model run took 1 second, this would take you over a million trillion years to compute.</a:t>
             </a:r>
-            <a:endParaRPr lang="en-US" sz="1200" baseline="0" dirty="0" smtClean="0">
-              <a:solidFill>
-                <a:prstClr val="black"/>
-              </a:solidFill>
-              <a:latin typeface="ArialMT"/>
-              <a:sym typeface="Wingdings"/>
-            </a:endParaRPr>
           </a:p>
         </p:txBody>
       </p:sp>
@@ -10840,22 +10833,14 @@
             </a:br>
             <a:r>
               <a:rPr lang="en-US" sz="9000" dirty="0" smtClean="0"/>
-              <a:t>DAT </a:t>
-            </a:r>
-            <a:r>
-              <a:rPr lang="en-US" sz="9000" dirty="0" smtClean="0"/>
-              <a:t>SCIENCE</a:t>
+              <a:t>DAT SCIENCE</a:t>
             </a:r>
             <a:br>
               <a:rPr lang="en-US" sz="9000" dirty="0" smtClean="0"/>
             </a:br>
             <a:r>
               <a:rPr lang="en-US" sz="6000" dirty="0" smtClean="0"/>
-              <a:t>Class </a:t>
-            </a:r>
-            <a:r>
-              <a:rPr lang="en-US" sz="6000" dirty="0" smtClean="0"/>
-              <a:t>9: DATA CLEANING AND MANIPULATION</a:t>
+              <a:t>Class 9: DATA CLEANING AND MANIPULATION</a:t>
             </a:r>
             <a:endParaRPr lang="en-US" sz="6000" dirty="0"/>
           </a:p>
@@ -10922,17 +10907,8 @@
             </a:pPr>
             <a:r>
               <a:rPr lang="en-US" dirty="0" smtClean="0"/>
-              <a:t>The </a:t>
-            </a:r>
-            <a:r>
-              <a:rPr lang="en-US" dirty="0" smtClean="0"/>
-              <a:t>predictive modeling </a:t>
-            </a:r>
-            <a:r>
-              <a:rPr lang="en-US" dirty="0" smtClean="0"/>
-              <a:t>pipeline</a:t>
-            </a:r>
-            <a:endParaRPr lang="en-US" dirty="0" smtClean="0"/>
+              <a:t>The predictive modeling pipeline</a:t>
+            </a:r>
           </a:p>
         </p:txBody>
       </p:sp>
@@ -11096,8 +11072,19 @@
                 <a:latin typeface=""/>
                 <a:cs typeface=""/>
               </a:rPr>
-              <a:t> with ‘other’</a:t>
-            </a:r>
+              <a:t> with </a:t>
+            </a:r>
+            <a:r>
+              <a:rPr lang="en-US" sz="1600" dirty="0" smtClean="0">
+                <a:latin typeface=""/>
+                <a:cs typeface=""/>
+              </a:rPr>
+              <a:t>‘Nothing’</a:t>
+            </a:r>
+            <a:endParaRPr lang="en-US" sz="1600" dirty="0">
+              <a:latin typeface=""/>
+              <a:cs typeface=""/>
+            </a:endParaRPr>
           </a:p>
           <a:p>
             <a:pPr marL="671513" lvl="1" indent="-342900" algn="l">
@@ -11155,7 +11142,21 @@
                 <a:latin typeface=""/>
                 <a:cs typeface=""/>
               </a:rPr>
-              <a:t>Remove feature with no variation.</a:t>
+              <a:t>Remove </a:t>
+            </a:r>
+            <a:r>
+              <a:rPr lang="en-US" sz="1600" b="1" dirty="0" smtClean="0">
+                <a:latin typeface=""/>
+                <a:cs typeface=""/>
+              </a:rPr>
+              <a:t>features </a:t>
+            </a:r>
+            <a:r>
+              <a:rPr lang="en-US" sz="1600" b="1" dirty="0">
+                <a:latin typeface=""/>
+                <a:cs typeface=""/>
+              </a:rPr>
+              <a:t>with no variation.</a:t>
             </a:r>
           </a:p>
           <a:p>
@@ -11968,7 +11969,6 @@
               <a:rPr lang="en-US" dirty="0" smtClean="0"/>
               <a:t>In class exercise: encoding and binning categorical data</a:t>
             </a:r>
-            <a:endParaRPr lang="en-US" dirty="0" smtClean="0"/>
           </a:p>
         </p:txBody>
       </p:sp>
@@ -12614,11 +12614,7 @@
             </a:pPr>
             <a:r>
               <a:rPr lang="en-US" sz="6600" dirty="0" smtClean="0"/>
-              <a:t>III. </a:t>
-            </a:r>
-            <a:r>
-              <a:rPr lang="en-US" sz="6600" dirty="0" smtClean="0"/>
-              <a:t>Feature standardization &amp; imputation</a:t>
+              <a:t>III. Feature standardization &amp; imputation</a:t>
             </a:r>
             <a:endParaRPr lang="en-US" sz="6600" dirty="0"/>
           </a:p>
@@ -12657,11 +12653,6 @@
               </a:rPr>
               <a:t>DATA CLEANING AND MANIPULATION</a:t>
             </a:r>
-            <a:endParaRPr lang="en-US" cap="none" dirty="0">
-              <a:latin typeface="PFDinTextCompPro-Bold" charset="0"/>
-              <a:ea typeface="ヒラギノ角ゴ ProN W3" charset="0"/>
-              <a:cs typeface="ヒラギノ角ゴ ProN W3" charset="0"/>
-            </a:endParaRPr>
           </a:p>
         </p:txBody>
       </p:sp>
@@ -12733,7 +12724,6 @@
               <a:rPr lang="en-US" dirty="0" smtClean="0"/>
               <a:t>FEATURE STANDARDIZATION</a:t>
             </a:r>
-            <a:endParaRPr lang="en-US" dirty="0" smtClean="0"/>
           </a:p>
         </p:txBody>
       </p:sp>
@@ -13266,7 +13256,6 @@
               <a:rPr lang="en-US" dirty="0" smtClean="0"/>
               <a:t>FEATURE IMPUTATION</a:t>
             </a:r>
-            <a:endParaRPr lang="en-US" dirty="0" smtClean="0"/>
           </a:p>
         </p:txBody>
       </p:sp>
@@ -13744,7 +13733,6 @@
               <a:rPr lang="en-US" dirty="0" smtClean="0"/>
               <a:t>FEATURE IMPUTATION</a:t>
             </a:r>
-            <a:endParaRPr lang="en-US" dirty="0" smtClean="0"/>
           </a:p>
         </p:txBody>
       </p:sp>
@@ -14222,7 +14210,6 @@
               <a:rPr lang="en-US" dirty="0" smtClean="0"/>
               <a:t>FEATURE IMPUTATION</a:t>
             </a:r>
-            <a:endParaRPr lang="en-US" dirty="0" smtClean="0"/>
           </a:p>
         </p:txBody>
       </p:sp>
@@ -14685,17 +14672,8 @@
             </a:pPr>
             <a:r>
               <a:rPr lang="en-US" dirty="0" smtClean="0"/>
-              <a:t>The </a:t>
-            </a:r>
-            <a:r>
-              <a:rPr lang="en-US" dirty="0" smtClean="0"/>
-              <a:t>predictive modeling </a:t>
-            </a:r>
-            <a:r>
-              <a:rPr lang="en-US" dirty="0" smtClean="0"/>
-              <a:t>pipeline</a:t>
-            </a:r>
-            <a:endParaRPr lang="en-US" dirty="0" smtClean="0"/>
+              <a:t>The predictive modeling pipeline</a:t>
+            </a:r>
           </a:p>
         </p:txBody>
       </p:sp>
@@ -14877,8 +14855,19 @@
                 <a:latin typeface=""/>
                 <a:cs typeface=""/>
               </a:rPr>
-              <a:t> with ‘other’</a:t>
-            </a:r>
+              <a:t> with </a:t>
+            </a:r>
+            <a:r>
+              <a:rPr lang="en-US" sz="1600" dirty="0" smtClean="0">
+                <a:latin typeface=""/>
+                <a:cs typeface=""/>
+              </a:rPr>
+              <a:t>‘Nothing’</a:t>
+            </a:r>
+            <a:endParaRPr lang="en-US" sz="1600" dirty="0">
+              <a:latin typeface=""/>
+              <a:cs typeface=""/>
+            </a:endParaRPr>
           </a:p>
           <a:p>
             <a:pPr marL="671513" lvl="1" indent="-342900" algn="l">
@@ -15906,11 +15895,6 @@
               </a:rPr>
               <a:t>DATA CLEANING AND MANIPULATION</a:t>
             </a:r>
-            <a:endParaRPr lang="en-US" cap="none" dirty="0">
-              <a:latin typeface="PFDinTextCompPro-Bold" charset="0"/>
-              <a:ea typeface="ヒラギノ角ゴ ProN W3" charset="0"/>
-              <a:cs typeface="ヒラギノ角ゴ ProN W3" charset="0"/>
-            </a:endParaRPr>
           </a:p>
         </p:txBody>
       </p:sp>
@@ -15982,7 +15966,6 @@
               <a:rPr lang="en-US" dirty="0" smtClean="0"/>
               <a:t>Recursive feature elimination</a:t>
             </a:r>
-            <a:endParaRPr lang="en-US" dirty="0" smtClean="0"/>
           </a:p>
         </p:txBody>
       </p:sp>
@@ -16661,23 +16644,7 @@
                 <a:ea typeface="ヒラギノ角ゴ ProN W6" charset="0"/>
                 <a:cs typeface="ヒラギノ角ゴ ProN W6" charset="0"/>
               </a:rPr>
-              <a:t>II.   </a:t>
-            </a:r>
-            <a:r>
-              <a:rPr lang="en-US" sz="3000" dirty="0" smtClean="0">
-                <a:latin typeface="PFDinTextCompPro-Bold" charset="0"/>
-                <a:ea typeface="ヒラギノ角ゴ ProN W6" charset="0"/>
-                <a:cs typeface="ヒラギノ角ゴ ProN W6" charset="0"/>
-              </a:rPr>
-              <a:t>	</a:t>
-            </a:r>
-            <a:r>
-              <a:rPr lang="en-US" sz="3000" dirty="0" smtClean="0">
-                <a:latin typeface="PFDinTextCompPro-Bold" charset="0"/>
-                <a:ea typeface="ヒラギノ角ゴ ProN W6" charset="0"/>
-                <a:cs typeface="ヒラギノ角ゴ ProN W6" charset="0"/>
-              </a:rPr>
-              <a:t>FINDING FEATURES WITH PERFECT CORRELATION / NO </a:t>
+              <a:t>II.   	FINDING FEATURES WITH PERFECT CORRELATION / NO </a:t>
             </a:r>
             <a:br>
               <a:rPr lang="en-US" sz="3000" dirty="0" smtClean="0">
@@ -16692,15 +16659,7 @@
                 <a:ea typeface="ヒラギノ角ゴ ProN W6" charset="0"/>
                 <a:cs typeface="ヒラギノ角ゴ ProN W6" charset="0"/>
               </a:rPr>
-              <a:t>	</a:t>
-            </a:r>
-            <a:r>
-              <a:rPr lang="en-US" sz="3000" dirty="0" smtClean="0">
-                <a:latin typeface="PFDinTextCompPro-Bold" charset="0"/>
-                <a:ea typeface="ヒラギノ角ゴ ProN W6" charset="0"/>
-                <a:cs typeface="ヒラギノ角ゴ ProN W6" charset="0"/>
-              </a:rPr>
-              <a:t>VARIATION</a:t>
+              <a:t>	VARIATION</a:t>
             </a:r>
             <a:br>
               <a:rPr lang="en-US" sz="3000" dirty="0" smtClean="0">
@@ -16715,15 +16674,7 @@
                 <a:ea typeface="ヒラギノ角ゴ ProN W6" charset="0"/>
                 <a:cs typeface="ヒラギノ角ゴ ProN W6" charset="0"/>
               </a:rPr>
-              <a:t>iii.	</a:t>
-            </a:r>
-            <a:r>
-              <a:rPr lang="en-US" sz="3000" dirty="0" smtClean="0">
-                <a:latin typeface="PFDinTextCompPro-Bold" charset="0"/>
-                <a:ea typeface="ヒラギノ角ゴ ProN W6" charset="0"/>
-                <a:cs typeface="ヒラギノ角ゴ ProN W6" charset="0"/>
-              </a:rPr>
-              <a:t>Feature standardization &amp; imputation</a:t>
+              <a:t>iii.	Feature standardization &amp; imputation</a:t>
             </a:r>
             <a:r>
               <a:rPr lang="en-US" sz="3000" dirty="0">
@@ -16746,31 +16697,7 @@
                 <a:ea typeface="ヒラギノ角ゴ ProN W6" charset="0"/>
                 <a:cs typeface="ヒラギノ角ゴ ProN W6" charset="0"/>
               </a:rPr>
-              <a:t>I</a:t>
-            </a:r>
-            <a:r>
-              <a:rPr lang="en-US" sz="3000" dirty="0" smtClean="0">
-                <a:latin typeface="PFDinTextCompPro-Bold" charset="0"/>
-                <a:ea typeface="ヒラギノ角ゴ ProN W6" charset="0"/>
-                <a:cs typeface="ヒラギノ角ゴ ProN W6" charset="0"/>
-              </a:rPr>
-              <a:t>V.   </a:t>
-            </a:r>
-            <a:r>
-              <a:rPr lang="en-US" sz="3000" dirty="0" smtClean="0">
-                <a:latin typeface="PFDinTextCompPro-Bold" charset="0"/>
-                <a:ea typeface="ヒラギノ角ゴ ProN W6" charset="0"/>
-                <a:cs typeface="ヒラギノ角ゴ ProN W6" charset="0"/>
-              </a:rPr>
-              <a:t>	</a:t>
-            </a:r>
-            <a:r>
-              <a:rPr lang="en-US" sz="3000" dirty="0" smtClean="0">
-                <a:latin typeface="PFDinTextCompPro-Bold" charset="0"/>
-                <a:ea typeface="ヒラギノ角ゴ ProN W6" charset="0"/>
-                <a:cs typeface="ヒラギノ角ゴ ProN W6" charset="0"/>
-              </a:rPr>
-              <a:t>Recursive feature elimination</a:t>
+              <a:t>IV.   	Recursive feature elimination</a:t>
             </a:r>
             <a:endParaRPr lang="en-US" sz="3000" cap="none" dirty="0">
               <a:latin typeface="PFDinTextCompPro-Bold" charset="0"/>
@@ -16925,7 +16852,6 @@
               <a:rPr lang="en-US" dirty="0" smtClean="0"/>
               <a:t>Recursive feature elimination</a:t>
             </a:r>
-            <a:endParaRPr lang="en-US" dirty="0" smtClean="0"/>
           </a:p>
         </p:txBody>
       </p:sp>
@@ -17469,7 +17395,6 @@
               <a:rPr lang="en-US" dirty="0" smtClean="0"/>
               <a:t>Recursive feature elimination</a:t>
             </a:r>
-            <a:endParaRPr lang="en-US" dirty="0" smtClean="0"/>
           </a:p>
         </p:txBody>
       </p:sp>
@@ -17913,7 +17838,6 @@
               <a:rPr lang="en-US" dirty="0" smtClean="0"/>
               <a:t>Recursive feature elimination</a:t>
             </a:r>
-            <a:endParaRPr lang="en-US" dirty="0" smtClean="0"/>
           </a:p>
         </p:txBody>
       </p:sp>
@@ -18349,17 +18273,8 @@
             </a:pPr>
             <a:r>
               <a:rPr lang="en-US" dirty="0" smtClean="0"/>
-              <a:t>The </a:t>
-            </a:r>
-            <a:r>
-              <a:rPr lang="en-US" dirty="0" smtClean="0"/>
-              <a:t>predictive modeling </a:t>
-            </a:r>
-            <a:r>
-              <a:rPr lang="en-US" dirty="0" smtClean="0"/>
-              <a:t>pipeline</a:t>
-            </a:r>
-            <a:endParaRPr lang="en-US" dirty="0" smtClean="0"/>
+              <a:t>The predictive modeling pipeline</a:t>
+            </a:r>
           </a:p>
         </p:txBody>
       </p:sp>
@@ -18541,8 +18456,19 @@
                 <a:latin typeface=""/>
                 <a:cs typeface=""/>
               </a:rPr>
-              <a:t> with ‘other’</a:t>
-            </a:r>
+              <a:t> with </a:t>
+            </a:r>
+            <a:r>
+              <a:rPr lang="en-US" sz="1600" dirty="0" smtClean="0">
+                <a:latin typeface=""/>
+                <a:cs typeface=""/>
+              </a:rPr>
+              <a:t>‘Nothing’</a:t>
+            </a:r>
+            <a:endParaRPr lang="en-US" sz="1600" dirty="0">
+              <a:latin typeface=""/>
+              <a:cs typeface=""/>
+            </a:endParaRPr>
           </a:p>
           <a:p>
             <a:pPr marL="671513" lvl="1" indent="-342900" algn="l">
@@ -19598,7 +19524,6 @@
               <a:rPr lang="en-US" dirty="0" smtClean="0"/>
               <a:t>In class exercise: Scaling, imputation, and RFE</a:t>
             </a:r>
-            <a:endParaRPr lang="en-US" dirty="0" smtClean="0"/>
           </a:p>
         </p:txBody>
       </p:sp>
@@ -20211,11 +20136,6 @@
               </a:rPr>
               <a:t>DATA CLEANING AND MANIPULATION</a:t>
             </a:r>
-            <a:endParaRPr lang="en-US" cap="none" dirty="0">
-              <a:latin typeface="PFDinTextCompPro-Bold" charset="0"/>
-              <a:ea typeface="ヒラギノ角ゴ ProN W3" charset="0"/>
-              <a:cs typeface="ヒラギノ角ゴ ProN W3" charset="0"/>
-            </a:endParaRPr>
           </a:p>
         </p:txBody>
       </p:sp>
@@ -20286,11 +20206,7 @@
             </a:r>
             <a:r>
               <a:rPr lang="en-US" sz="6600" dirty="0" smtClean="0"/>
-              <a:t>. </a:t>
-            </a:r>
-            <a:r>
-              <a:rPr lang="en-US" sz="6600" dirty="0" smtClean="0"/>
-              <a:t>ENCODING &amp; BINNING CATEGORICAL DATA</a:t>
+              <a:t>. ENCODING &amp; BINNING CATEGORICAL DATA</a:t>
             </a:r>
             <a:endParaRPr lang="en-US" sz="6600" dirty="0"/>
           </a:p>
@@ -20405,7 +20321,6 @@
               <a:rPr lang="en-US" dirty="0" smtClean="0"/>
               <a:t>Encoding &amp; BINNING categorical data</a:t>
             </a:r>
-            <a:endParaRPr lang="en-US" dirty="0" smtClean="0"/>
           </a:p>
         </p:txBody>
       </p:sp>
@@ -20498,14 +20413,7 @@
                 <a:latin typeface=""/>
                 <a:cs typeface=""/>
               </a:rPr>
-              <a:t>Recall </a:t>
-            </a:r>
-            <a:r>
-              <a:rPr lang="en-US" sz="1800" dirty="0" smtClean="0">
-                <a:latin typeface=""/>
-                <a:cs typeface=""/>
-              </a:rPr>
-              <a:t>that in our last class, we discussed how all models </a:t>
+              <a:t>Recall that in our last class, we discussed how all models </a:t>
             </a:r>
             <a:r>
               <a:rPr lang="en-US" sz="1800" dirty="0" err="1" smtClean="0">
@@ -20969,7 +20877,6 @@
               <a:rPr lang="en-US" dirty="0" smtClean="0"/>
               <a:t>Encoding &amp; BINNING categorical data</a:t>
             </a:r>
-            <a:endParaRPr lang="en-US" dirty="0" smtClean="0"/>
           </a:p>
         </p:txBody>
       </p:sp>
@@ -21585,17 +21492,8 @@
             </a:pPr>
             <a:r>
               <a:rPr lang="en-US" dirty="0" smtClean="0"/>
-              <a:t>The </a:t>
-            </a:r>
-            <a:r>
-              <a:rPr lang="en-US" dirty="0" smtClean="0"/>
-              <a:t>predictive modeling </a:t>
-            </a:r>
-            <a:r>
-              <a:rPr lang="en-US" dirty="0" smtClean="0"/>
-              <a:t>pipeline</a:t>
-            </a:r>
-            <a:endParaRPr lang="en-US" dirty="0" smtClean="0"/>
+              <a:t>The predictive modeling pipeline</a:t>
+            </a:r>
           </a:p>
         </p:txBody>
       </p:sp>
@@ -21688,14 +21586,7 @@
                 <a:latin typeface=""/>
                 <a:cs typeface=""/>
               </a:rPr>
-              <a:t>Let’s start making a list of what we need to do to get our data ready for use by our predictive model, and what to do to it on its way back out of the model for use by </a:t>
-            </a:r>
-            <a:r>
-              <a:rPr lang="en-US" sz="1800" dirty="0" smtClean="0">
-                <a:latin typeface=""/>
-                <a:cs typeface=""/>
-              </a:rPr>
-              <a:t>our consumer.  So far, we have:</a:t>
+              <a:t>Let’s start making a list of what we need to do to get our data ready for use by our predictive model, and what to do to it on its way back out of the model for use by our consumer.  So far, we have:</a:t>
             </a:r>
           </a:p>
           <a:p>
@@ -21797,14 +21688,14 @@
                 <a:latin typeface=""/>
                 <a:cs typeface=""/>
               </a:rPr>
-              <a:t> with ‘other</a:t>
+              <a:t> with </a:t>
             </a:r>
             <a:r>
               <a:rPr lang="en-US" sz="1600" dirty="0" smtClean="0">
                 <a:latin typeface=""/>
                 <a:cs typeface=""/>
               </a:rPr>
-              <a:t>’</a:t>
+              <a:t>‘Nothing’</a:t>
             </a:r>
             <a:endParaRPr lang="en-US" sz="1600" dirty="0">
               <a:latin typeface=""/>
@@ -21849,7 +21740,14 @@
                 <a:latin typeface=""/>
                 <a:cs typeface=""/>
               </a:rPr>
-              <a:t>under ‘other’</a:t>
+              <a:t>under </a:t>
+            </a:r>
+            <a:r>
+              <a:rPr lang="en-US" sz="1600" b="1" dirty="0" smtClean="0">
+                <a:latin typeface=""/>
+                <a:cs typeface=""/>
+              </a:rPr>
+              <a:t>‘other’</a:t>
             </a:r>
             <a:endParaRPr lang="en-US" sz="1600" b="1" dirty="0">
               <a:latin typeface=""/>
@@ -22589,11 +22487,7 @@
             </a:pPr>
             <a:r>
               <a:rPr lang="en-US" sz="6600" dirty="0" smtClean="0"/>
-              <a:t>II. </a:t>
-            </a:r>
-            <a:r>
-              <a:rPr lang="en-US" sz="6600" dirty="0" smtClean="0"/>
-              <a:t>FINDING FEATUREs WITH PERFECT CORRELATION AND / OR NO VARIATION</a:t>
+              <a:t>II. FINDING FEATUREs WITH PERFECT CORRELATION AND / OR NO VARIATION</a:t>
             </a:r>
             <a:endParaRPr lang="en-US" sz="6600" dirty="0"/>
           </a:p>
@@ -22716,7 +22610,6 @@
               <a:rPr lang="en-US" dirty="0" smtClean="0"/>
               <a:t>features with no variation</a:t>
             </a:r>
-            <a:endParaRPr lang="en-US" dirty="0" smtClean="0"/>
           </a:p>
         </p:txBody>
       </p:sp>
@@ -23293,7 +23186,6 @@
               <a:rPr lang="en-US" dirty="0" smtClean="0"/>
               <a:t>features with perfect correlation</a:t>
             </a:r>
-            <a:endParaRPr lang="en-US" dirty="0" smtClean="0"/>
           </a:p>
         </p:txBody>
       </p:sp>

</xml_diff>